<commit_message>
Changed and completed dataset functionality
</commit_message>
<xml_diff>
--- a/UI.pptx
+++ b/UI.pptx
@@ -259,7 +259,7 @@
           <a:p>
             <a:fld id="{5B55B967-0EB3-40E5-9AC0-FF2FC2769CA5}" type="datetimeFigureOut">
               <a:rPr lang="en-US" smtClean="0"/>
-              <a:t>29-Apr-20</a:t>
+              <a:t>10-May-20</a:t>
             </a:fld>
             <a:endParaRPr lang="en-US"/>
           </a:p>
@@ -457,7 +457,7 @@
           <a:p>
             <a:fld id="{5B55B967-0EB3-40E5-9AC0-FF2FC2769CA5}" type="datetimeFigureOut">
               <a:rPr lang="en-US" smtClean="0"/>
-              <a:t>29-Apr-20</a:t>
+              <a:t>10-May-20</a:t>
             </a:fld>
             <a:endParaRPr lang="en-US"/>
           </a:p>
@@ -665,7 +665,7 @@
           <a:p>
             <a:fld id="{5B55B967-0EB3-40E5-9AC0-FF2FC2769CA5}" type="datetimeFigureOut">
               <a:rPr lang="en-US" smtClean="0"/>
-              <a:t>29-Apr-20</a:t>
+              <a:t>10-May-20</a:t>
             </a:fld>
             <a:endParaRPr lang="en-US"/>
           </a:p>
@@ -863,7 +863,7 @@
           <a:p>
             <a:fld id="{5B55B967-0EB3-40E5-9AC0-FF2FC2769CA5}" type="datetimeFigureOut">
               <a:rPr lang="en-US" smtClean="0"/>
-              <a:t>29-Apr-20</a:t>
+              <a:t>10-May-20</a:t>
             </a:fld>
             <a:endParaRPr lang="en-US"/>
           </a:p>
@@ -1138,7 +1138,7 @@
           <a:p>
             <a:fld id="{5B55B967-0EB3-40E5-9AC0-FF2FC2769CA5}" type="datetimeFigureOut">
               <a:rPr lang="en-US" smtClean="0"/>
-              <a:t>29-Apr-20</a:t>
+              <a:t>10-May-20</a:t>
             </a:fld>
             <a:endParaRPr lang="en-US"/>
           </a:p>
@@ -1403,7 +1403,7 @@
           <a:p>
             <a:fld id="{5B55B967-0EB3-40E5-9AC0-FF2FC2769CA5}" type="datetimeFigureOut">
               <a:rPr lang="en-US" smtClean="0"/>
-              <a:t>29-Apr-20</a:t>
+              <a:t>10-May-20</a:t>
             </a:fld>
             <a:endParaRPr lang="en-US"/>
           </a:p>
@@ -1815,7 +1815,7 @@
           <a:p>
             <a:fld id="{5B55B967-0EB3-40E5-9AC0-FF2FC2769CA5}" type="datetimeFigureOut">
               <a:rPr lang="en-US" smtClean="0"/>
-              <a:t>29-Apr-20</a:t>
+              <a:t>10-May-20</a:t>
             </a:fld>
             <a:endParaRPr lang="en-US"/>
           </a:p>
@@ -1956,7 +1956,7 @@
           <a:p>
             <a:fld id="{5B55B967-0EB3-40E5-9AC0-FF2FC2769CA5}" type="datetimeFigureOut">
               <a:rPr lang="en-US" smtClean="0"/>
-              <a:t>29-Apr-20</a:t>
+              <a:t>10-May-20</a:t>
             </a:fld>
             <a:endParaRPr lang="en-US"/>
           </a:p>
@@ -2069,7 +2069,7 @@
           <a:p>
             <a:fld id="{5B55B967-0EB3-40E5-9AC0-FF2FC2769CA5}" type="datetimeFigureOut">
               <a:rPr lang="en-US" smtClean="0"/>
-              <a:t>29-Apr-20</a:t>
+              <a:t>10-May-20</a:t>
             </a:fld>
             <a:endParaRPr lang="en-US"/>
           </a:p>
@@ -2380,7 +2380,7 @@
           <a:p>
             <a:fld id="{5B55B967-0EB3-40E5-9AC0-FF2FC2769CA5}" type="datetimeFigureOut">
               <a:rPr lang="en-US" smtClean="0"/>
-              <a:t>29-Apr-20</a:t>
+              <a:t>10-May-20</a:t>
             </a:fld>
             <a:endParaRPr lang="en-US"/>
           </a:p>
@@ -2668,7 +2668,7 @@
           <a:p>
             <a:fld id="{5B55B967-0EB3-40E5-9AC0-FF2FC2769CA5}" type="datetimeFigureOut">
               <a:rPr lang="en-US" smtClean="0"/>
-              <a:t>29-Apr-20</a:t>
+              <a:t>10-May-20</a:t>
             </a:fld>
             <a:endParaRPr lang="en-US"/>
           </a:p>
@@ -2909,7 +2909,7 @@
           <a:p>
             <a:fld id="{5B55B967-0EB3-40E5-9AC0-FF2FC2769CA5}" type="datetimeFigureOut">
               <a:rPr lang="en-US" smtClean="0"/>
-              <a:t>29-Apr-20</a:t>
+              <a:t>10-May-20</a:t>
             </a:fld>
             <a:endParaRPr lang="en-US"/>
           </a:p>
@@ -3383,8 +3383,8 @@
         </p:nvSpPr>
         <p:spPr>
           <a:xfrm>
-            <a:off x="466725" y="1825624"/>
-            <a:ext cx="1590675" cy="314325"/>
+            <a:off x="466726" y="1844320"/>
+            <a:ext cx="1120776" cy="362631"/>
           </a:xfrm>
           <a:prstGeom prst="rect">
             <a:avLst/>
@@ -3437,8 +3437,8 @@
         </p:nvSpPr>
         <p:spPr>
           <a:xfrm>
-            <a:off x="2343150" y="1825623"/>
-            <a:ext cx="1590675" cy="314325"/>
+            <a:off x="1795992" y="1844320"/>
+            <a:ext cx="1120776" cy="362631"/>
           </a:xfrm>
           <a:prstGeom prst="rect">
             <a:avLst/>
@@ -3491,8 +3491,8 @@
         </p:nvSpPr>
         <p:spPr>
           <a:xfrm>
-            <a:off x="4219575" y="1825624"/>
-            <a:ext cx="1590675" cy="314325"/>
+            <a:off x="3125258" y="1844320"/>
+            <a:ext cx="1120776" cy="362631"/>
           </a:xfrm>
           <a:prstGeom prst="rect">
             <a:avLst/>
@@ -3545,8 +3545,8 @@
         </p:nvSpPr>
         <p:spPr>
           <a:xfrm>
-            <a:off x="6096000" y="1825624"/>
-            <a:ext cx="1590675" cy="314325"/>
+            <a:off x="7113056" y="1844320"/>
+            <a:ext cx="1120776" cy="362631"/>
           </a:xfrm>
           <a:prstGeom prst="rect">
             <a:avLst/>
@@ -3690,287 +3690,6 @@
           </a:p>
         </p:txBody>
       </p:sp>
-      <p:sp>
-        <p:nvSpPr>
-          <p:cNvPr id="12" name="Rectangle 11">
-            <a:extLst>
-              <a:ext uri="{FF2B5EF4-FFF2-40B4-BE49-F238E27FC236}">
-                <a16:creationId xmlns:a16="http://schemas.microsoft.com/office/drawing/2014/main" id="{598C7FB2-C792-4008-8854-5EB1FED5162C}"/>
-              </a:ext>
-            </a:extLst>
-          </p:cNvPr>
-          <p:cNvSpPr/>
-          <p:nvPr/>
-        </p:nvSpPr>
-        <p:spPr>
-          <a:xfrm>
-            <a:off x="466725" y="856178"/>
-            <a:ext cx="1590675" cy="314325"/>
-          </a:xfrm>
-          <a:prstGeom prst="rect">
-            <a:avLst/>
-          </a:prstGeom>
-          <a:noFill/>
-        </p:spPr>
-        <p:style>
-          <a:lnRef idx="2">
-            <a:schemeClr val="accent1">
-              <a:shade val="50000"/>
-            </a:schemeClr>
-          </a:lnRef>
-          <a:fillRef idx="1">
-            <a:schemeClr val="accent1"/>
-          </a:fillRef>
-          <a:effectRef idx="0">
-            <a:schemeClr val="accent1"/>
-          </a:effectRef>
-          <a:fontRef idx="minor">
-            <a:schemeClr val="lt1"/>
-          </a:fontRef>
-        </p:style>
-        <p:txBody>
-          <a:bodyPr rtlCol="0" anchor="ctr"/>
-          <a:lstStyle/>
-          <a:p>
-            <a:pPr algn="ctr"/>
-            <a:r>
-              <a:rPr lang="en-US" dirty="0">
-                <a:solidFill>
-                  <a:schemeClr val="tx1"/>
-                </a:solidFill>
-              </a:rPr>
-              <a:t>Value name</a:t>
-            </a:r>
-          </a:p>
-        </p:txBody>
-      </p:sp>
-      <p:sp>
-        <p:nvSpPr>
-          <p:cNvPr id="13" name="TextBox 12">
-            <a:extLst>
-              <a:ext uri="{FF2B5EF4-FFF2-40B4-BE49-F238E27FC236}">
-                <a16:creationId xmlns:a16="http://schemas.microsoft.com/office/drawing/2014/main" id="{4363A588-584B-47ED-A7E8-BBD3BFE62E50}"/>
-              </a:ext>
-            </a:extLst>
-          </p:cNvPr>
-          <p:cNvSpPr txBox="1"/>
-          <p:nvPr/>
-        </p:nvSpPr>
-        <p:spPr>
-          <a:xfrm>
-            <a:off x="2781300" y="828675"/>
-            <a:ext cx="678391" cy="369332"/>
-          </a:xfrm>
-          <a:prstGeom prst="rect">
-            <a:avLst/>
-          </a:prstGeom>
-          <a:noFill/>
-        </p:spPr>
-        <p:txBody>
-          <a:bodyPr wrap="none" rtlCol="0">
-            <a:spAutoFit/>
-          </a:bodyPr>
-          <a:lstStyle/>
-          <a:p>
-            <a:r>
-              <a:rPr lang="en-US" dirty="0"/>
-              <a:t>Goal:</a:t>
-            </a:r>
-          </a:p>
-        </p:txBody>
-      </p:sp>
-      <p:sp>
-        <p:nvSpPr>
-          <p:cNvPr id="14" name="Rectangle 13">
-            <a:extLst>
-              <a:ext uri="{FF2B5EF4-FFF2-40B4-BE49-F238E27FC236}">
-                <a16:creationId xmlns:a16="http://schemas.microsoft.com/office/drawing/2014/main" id="{DBFEAC67-4E46-4BE6-B8D3-A210AAA9DADE}"/>
-              </a:ext>
-            </a:extLst>
-          </p:cNvPr>
-          <p:cNvSpPr/>
-          <p:nvPr/>
-        </p:nvSpPr>
-        <p:spPr>
-          <a:xfrm>
-            <a:off x="3473836" y="826962"/>
-            <a:ext cx="1590675" cy="314325"/>
-          </a:xfrm>
-          <a:prstGeom prst="rect">
-            <a:avLst/>
-          </a:prstGeom>
-          <a:noFill/>
-        </p:spPr>
-        <p:style>
-          <a:lnRef idx="2">
-            <a:schemeClr val="accent1">
-              <a:shade val="50000"/>
-            </a:schemeClr>
-          </a:lnRef>
-          <a:fillRef idx="1">
-            <a:schemeClr val="accent1"/>
-          </a:fillRef>
-          <a:effectRef idx="0">
-            <a:schemeClr val="accent1"/>
-          </a:effectRef>
-          <a:fontRef idx="minor">
-            <a:schemeClr val="lt1"/>
-          </a:fontRef>
-        </p:style>
-        <p:txBody>
-          <a:bodyPr rtlCol="0" anchor="ctr"/>
-          <a:lstStyle/>
-          <a:p>
-            <a:pPr algn="ctr"/>
-            <a:r>
-              <a:rPr lang="en-US" dirty="0">
-                <a:solidFill>
-                  <a:schemeClr val="tx1"/>
-                </a:solidFill>
-              </a:rPr>
-              <a:t>Value</a:t>
-            </a:r>
-          </a:p>
-        </p:txBody>
-      </p:sp>
-      <p:sp>
-        <p:nvSpPr>
-          <p:cNvPr id="15" name="TextBox 14">
-            <a:extLst>
-              <a:ext uri="{FF2B5EF4-FFF2-40B4-BE49-F238E27FC236}">
-                <a16:creationId xmlns:a16="http://schemas.microsoft.com/office/drawing/2014/main" id="{437444B0-0F1E-42A5-98D2-5706D3CD4B7D}"/>
-              </a:ext>
-            </a:extLst>
-          </p:cNvPr>
-          <p:cNvSpPr txBox="1"/>
-          <p:nvPr/>
-        </p:nvSpPr>
-        <p:spPr>
-          <a:xfrm>
-            <a:off x="5104409" y="799458"/>
-            <a:ext cx="502061" cy="369332"/>
-          </a:xfrm>
-          <a:prstGeom prst="rect">
-            <a:avLst/>
-          </a:prstGeom>
-          <a:noFill/>
-        </p:spPr>
-        <p:txBody>
-          <a:bodyPr wrap="none" rtlCol="0">
-            <a:spAutoFit/>
-          </a:bodyPr>
-          <a:lstStyle/>
-          <a:p>
-            <a:r>
-              <a:rPr lang="en-US" dirty="0"/>
-              <a:t>per</a:t>
-            </a:r>
-          </a:p>
-        </p:txBody>
-      </p:sp>
-      <p:sp>
-        <p:nvSpPr>
-          <p:cNvPr id="16" name="Rectangle 15">
-            <a:extLst>
-              <a:ext uri="{FF2B5EF4-FFF2-40B4-BE49-F238E27FC236}">
-                <a16:creationId xmlns:a16="http://schemas.microsoft.com/office/drawing/2014/main" id="{748EB22D-3167-4066-9B81-B905B554C149}"/>
-              </a:ext>
-            </a:extLst>
-          </p:cNvPr>
-          <p:cNvSpPr/>
-          <p:nvPr/>
-        </p:nvSpPr>
-        <p:spPr>
-          <a:xfrm>
-            <a:off x="5646368" y="820651"/>
-            <a:ext cx="1590675" cy="314325"/>
-          </a:xfrm>
-          <a:prstGeom prst="rect">
-            <a:avLst/>
-          </a:prstGeom>
-          <a:noFill/>
-        </p:spPr>
-        <p:style>
-          <a:lnRef idx="2">
-            <a:schemeClr val="accent1">
-              <a:shade val="50000"/>
-            </a:schemeClr>
-          </a:lnRef>
-          <a:fillRef idx="1">
-            <a:schemeClr val="accent1"/>
-          </a:fillRef>
-          <a:effectRef idx="0">
-            <a:schemeClr val="accent1"/>
-          </a:effectRef>
-          <a:fontRef idx="minor">
-            <a:schemeClr val="lt1"/>
-          </a:fontRef>
-        </p:style>
-        <p:txBody>
-          <a:bodyPr rtlCol="0" anchor="ctr"/>
-          <a:lstStyle/>
-          <a:p>
-            <a:pPr algn="ctr"/>
-            <a:r>
-              <a:rPr lang="en-US" dirty="0">
-                <a:solidFill>
-                  <a:schemeClr val="tx1"/>
-                </a:solidFill>
-              </a:rPr>
-              <a:t>Timeframe</a:t>
-            </a:r>
-          </a:p>
-        </p:txBody>
-      </p:sp>
-      <p:sp>
-        <p:nvSpPr>
-          <p:cNvPr id="17" name="Rectangle 16">
-            <a:extLst>
-              <a:ext uri="{FF2B5EF4-FFF2-40B4-BE49-F238E27FC236}">
-                <a16:creationId xmlns:a16="http://schemas.microsoft.com/office/drawing/2014/main" id="{73C7D40D-74E5-4B79-86B9-E49B3B19873F}"/>
-              </a:ext>
-            </a:extLst>
-          </p:cNvPr>
-          <p:cNvSpPr/>
-          <p:nvPr/>
-        </p:nvSpPr>
-        <p:spPr>
-          <a:xfrm>
-            <a:off x="4131410" y="390524"/>
-            <a:ext cx="812066" cy="314325"/>
-          </a:xfrm>
-          <a:prstGeom prst="rect">
-            <a:avLst/>
-          </a:prstGeom>
-        </p:spPr>
-        <p:style>
-          <a:lnRef idx="2">
-            <a:schemeClr val="accent1">
-              <a:shade val="50000"/>
-            </a:schemeClr>
-          </a:lnRef>
-          <a:fillRef idx="1">
-            <a:schemeClr val="accent1"/>
-          </a:fillRef>
-          <a:effectRef idx="0">
-            <a:schemeClr val="accent1"/>
-          </a:effectRef>
-          <a:fontRef idx="minor">
-            <a:schemeClr val="lt1"/>
-          </a:fontRef>
-        </p:style>
-        <p:txBody>
-          <a:bodyPr rtlCol="0" anchor="ctr"/>
-          <a:lstStyle/>
-          <a:p>
-            <a:pPr algn="ctr"/>
-            <a:r>
-              <a:rPr lang="en-US" dirty="0"/>
-              <a:t>New</a:t>
-            </a:r>
-          </a:p>
-        </p:txBody>
-      </p:sp>
       <p:graphicFrame>
         <p:nvGraphicFramePr>
           <p:cNvPr id="22" name="Table 22">
@@ -3986,14 +3705,14 @@
           <p:nvPr>
             <p:extLst>
               <p:ext uri="{D42A27DB-BD31-4B8C-83A1-F6EECF244321}">
-                <p14:modId xmlns:p14="http://schemas.microsoft.com/office/powerpoint/2010/main" val="539763843"/>
+                <p14:modId xmlns:p14="http://schemas.microsoft.com/office/powerpoint/2010/main" val="2674372324"/>
               </p:ext>
             </p:extLst>
           </p:nvPr>
         </p:nvGraphicFramePr>
         <p:xfrm>
           <a:off x="5526125" y="2823606"/>
-          <a:ext cx="4036974" cy="3128968"/>
+          <a:ext cx="4036975" cy="3128968"/>
         </p:xfrm>
         <a:graphic>
           <a:graphicData uri="http://schemas.openxmlformats.org/drawingml/2006/table">
@@ -4002,24 +3721,38 @@
                 <a:tableStyleId>{5C22544A-7EE6-4342-B048-85BDC9FD1C3A}</a:tableStyleId>
               </a:tblPr>
               <a:tblGrid>
-                <a:gridCol w="1345658">
+                <a:gridCol w="807395">
                   <a:extLst>
                     <a:ext uri="{9D8B030D-6E8A-4147-A177-3AD203B41FA5}">
                       <a16:colId xmlns:a16="http://schemas.microsoft.com/office/drawing/2014/main" val="4036152571"/>
                     </a:ext>
                   </a:extLst>
                 </a:gridCol>
-                <a:gridCol w="1345658">
+                <a:gridCol w="807395">
                   <a:extLst>
                     <a:ext uri="{9D8B030D-6E8A-4147-A177-3AD203B41FA5}">
                       <a16:colId xmlns:a16="http://schemas.microsoft.com/office/drawing/2014/main" val="3350253654"/>
                     </a:ext>
                   </a:extLst>
                 </a:gridCol>
-                <a:gridCol w="1345658">
+                <a:gridCol w="807395">
                   <a:extLst>
                     <a:ext uri="{9D8B030D-6E8A-4147-A177-3AD203B41FA5}">
                       <a16:colId xmlns:a16="http://schemas.microsoft.com/office/drawing/2014/main" val="4203803425"/>
+                    </a:ext>
+                  </a:extLst>
+                </a:gridCol>
+                <a:gridCol w="807395">
+                  <a:extLst>
+                    <a:ext uri="{9D8B030D-6E8A-4147-A177-3AD203B41FA5}">
+                      <a16:colId xmlns:a16="http://schemas.microsoft.com/office/drawing/2014/main" val="1979544452"/>
+                    </a:ext>
+                  </a:extLst>
+                </a:gridCol>
+                <a:gridCol w="807395">
+                  <a:extLst>
+                    <a:ext uri="{9D8B030D-6E8A-4147-A177-3AD203B41FA5}">
+                      <a16:colId xmlns:a16="http://schemas.microsoft.com/office/drawing/2014/main" val="3546488320"/>
                     </a:ext>
                   </a:extLst>
                 </a:gridCol>
@@ -4079,6 +3812,32 @@
                   </a:txBody>
                   <a:tcPr/>
                 </a:tc>
+                <a:tc>
+                  <a:txBody>
+                    <a:bodyPr/>
+                    <a:lstStyle/>
+                    <a:p>
+                      <a:r>
+                        <a:rPr lang="en-US" dirty="0"/>
+                        <a:t>Goal</a:t>
+                      </a:r>
+                    </a:p>
+                  </a:txBody>
+                  <a:tcPr/>
+                </a:tc>
+                <a:tc>
+                  <a:txBody>
+                    <a:bodyPr/>
+                    <a:lstStyle/>
+                    <a:p>
+                      <a:r>
+                        <a:rPr lang="en-US" dirty="0"/>
+                        <a:t>Time</a:t>
+                      </a:r>
+                    </a:p>
+                  </a:txBody>
+                  <a:tcPr/>
+                </a:tc>
                 <a:extLst>
                   <a:ext uri="{0D108BD9-81ED-4DB2-BD59-A6C34878D82A}">
                     <a16:rowId xmlns:a16="http://schemas.microsoft.com/office/drawing/2014/main" val="1796758991"/>
@@ -4086,6 +3845,26 @@
                 </a:extLst>
               </a:tr>
               <a:tr h="391121">
+                <a:tc>
+                  <a:txBody>
+                    <a:bodyPr/>
+                    <a:lstStyle/>
+                    <a:p>
+                      <a:endParaRPr lang="en-US"/>
+                    </a:p>
+                  </a:txBody>
+                  <a:tcPr/>
+                </a:tc>
+                <a:tc>
+                  <a:txBody>
+                    <a:bodyPr/>
+                    <a:lstStyle/>
+                    <a:p>
+                      <a:endParaRPr lang="en-US"/>
+                    </a:p>
+                  </a:txBody>
+                  <a:tcPr/>
+                </a:tc>
                 <a:tc>
                   <a:txBody>
                     <a:bodyPr/>
@@ -4153,6 +3932,26 @@
                   </a:txBody>
                   <a:tcPr/>
                 </a:tc>
+                <a:tc>
+                  <a:txBody>
+                    <a:bodyPr/>
+                    <a:lstStyle/>
+                    <a:p>
+                      <a:endParaRPr lang="en-US"/>
+                    </a:p>
+                  </a:txBody>
+                  <a:tcPr/>
+                </a:tc>
+                <a:tc>
+                  <a:txBody>
+                    <a:bodyPr/>
+                    <a:lstStyle/>
+                    <a:p>
+                      <a:endParaRPr lang="en-US"/>
+                    </a:p>
+                  </a:txBody>
+                  <a:tcPr/>
+                </a:tc>
                 <a:extLst>
                   <a:ext uri="{0D108BD9-81ED-4DB2-BD59-A6C34878D82A}">
                     <a16:rowId xmlns:a16="http://schemas.microsoft.com/office/drawing/2014/main" val="1658253126"/>
@@ -4190,6 +3989,26 @@
                   </a:txBody>
                   <a:tcPr/>
                 </a:tc>
+                <a:tc>
+                  <a:txBody>
+                    <a:bodyPr/>
+                    <a:lstStyle/>
+                    <a:p>
+                      <a:endParaRPr lang="en-US"/>
+                    </a:p>
+                  </a:txBody>
+                  <a:tcPr/>
+                </a:tc>
+                <a:tc>
+                  <a:txBody>
+                    <a:bodyPr/>
+                    <a:lstStyle/>
+                    <a:p>
+                      <a:endParaRPr lang="en-US"/>
+                    </a:p>
+                  </a:txBody>
+                  <a:tcPr/>
+                </a:tc>
                 <a:extLst>
                   <a:ext uri="{0D108BD9-81ED-4DB2-BD59-A6C34878D82A}">
                     <a16:rowId xmlns:a16="http://schemas.microsoft.com/office/drawing/2014/main" val="901307152"/>
@@ -4197,6 +4016,26 @@
                 </a:extLst>
               </a:tr>
               <a:tr h="391121">
+                <a:tc>
+                  <a:txBody>
+                    <a:bodyPr/>
+                    <a:lstStyle/>
+                    <a:p>
+                      <a:endParaRPr lang="en-US"/>
+                    </a:p>
+                  </a:txBody>
+                  <a:tcPr/>
+                </a:tc>
+                <a:tc>
+                  <a:txBody>
+                    <a:bodyPr/>
+                    <a:lstStyle/>
+                    <a:p>
+                      <a:endParaRPr lang="en-US"/>
+                    </a:p>
+                  </a:txBody>
+                  <a:tcPr/>
+                </a:tc>
                 <a:tc>
                   <a:txBody>
                     <a:bodyPr/>
@@ -4264,6 +4103,26 @@
                   </a:txBody>
                   <a:tcPr/>
                 </a:tc>
+                <a:tc>
+                  <a:txBody>
+                    <a:bodyPr/>
+                    <a:lstStyle/>
+                    <a:p>
+                      <a:endParaRPr lang="en-US"/>
+                    </a:p>
+                  </a:txBody>
+                  <a:tcPr/>
+                </a:tc>
+                <a:tc>
+                  <a:txBody>
+                    <a:bodyPr/>
+                    <a:lstStyle/>
+                    <a:p>
+                      <a:endParaRPr lang="en-US"/>
+                    </a:p>
+                  </a:txBody>
+                  <a:tcPr/>
+                </a:tc>
                 <a:extLst>
                   <a:ext uri="{0D108BD9-81ED-4DB2-BD59-A6C34878D82A}">
                     <a16:rowId xmlns:a16="http://schemas.microsoft.com/office/drawing/2014/main" val="973750150"/>
@@ -4271,6 +4130,26 @@
                 </a:extLst>
               </a:tr>
               <a:tr h="391121">
+                <a:tc>
+                  <a:txBody>
+                    <a:bodyPr/>
+                    <a:lstStyle/>
+                    <a:p>
+                      <a:endParaRPr lang="en-US"/>
+                    </a:p>
+                  </a:txBody>
+                  <a:tcPr/>
+                </a:tc>
+                <a:tc>
+                  <a:txBody>
+                    <a:bodyPr/>
+                    <a:lstStyle/>
+                    <a:p>
+                      <a:endParaRPr lang="en-US"/>
+                    </a:p>
+                  </a:txBody>
+                  <a:tcPr/>
+                </a:tc>
                 <a:tc>
                   <a:txBody>
                     <a:bodyPr/>
@@ -4313,6 +4192,16 @@
                     <a:bodyPr/>
                     <a:lstStyle/>
                     <a:p>
+                      <a:endParaRPr lang="en-US" dirty="0"/>
+                    </a:p>
+                  </a:txBody>
+                  <a:tcPr/>
+                </a:tc>
+                <a:tc>
+                  <a:txBody>
+                    <a:bodyPr/>
+                    <a:lstStyle/>
+                    <a:p>
                       <a:endParaRPr lang="en-US"/>
                     </a:p>
                   </a:txBody>
@@ -4323,7 +4212,17 @@
                     <a:bodyPr/>
                     <a:lstStyle/>
                     <a:p>
-                      <a:endParaRPr lang="en-US"/>
+                      <a:endParaRPr lang="en-US" dirty="0"/>
+                    </a:p>
+                  </a:txBody>
+                  <a:tcPr/>
+                </a:tc>
+                <a:tc>
+                  <a:txBody>
+                    <a:bodyPr/>
+                    <a:lstStyle/>
+                    <a:p>
+                      <a:endParaRPr lang="en-US" dirty="0"/>
                     </a:p>
                   </a:txBody>
                   <a:tcPr/>
@@ -5179,8 +5078,8 @@
         </p:nvSpPr>
         <p:spPr>
           <a:xfrm>
-            <a:off x="7972425" y="1805796"/>
-            <a:ext cx="1590675" cy="314325"/>
+            <a:off x="8442324" y="1836675"/>
+            <a:ext cx="1120776" cy="362631"/>
           </a:xfrm>
           <a:prstGeom prst="rect">
             <a:avLst/>
@@ -5553,41 +5452,6 @@
       </p:sp>
       <p:sp>
         <p:nvSpPr>
-          <p:cNvPr id="45" name="TextBox 44">
-            <a:extLst>
-              <a:ext uri="{FF2B5EF4-FFF2-40B4-BE49-F238E27FC236}">
-                <a16:creationId xmlns:a16="http://schemas.microsoft.com/office/drawing/2014/main" id="{532C6531-9BBF-455B-9A03-AFA45219BAFA}"/>
-              </a:ext>
-            </a:extLst>
-          </p:cNvPr>
-          <p:cNvSpPr txBox="1"/>
-          <p:nvPr/>
-        </p:nvSpPr>
-        <p:spPr>
-          <a:xfrm>
-            <a:off x="11134" y="793147"/>
-            <a:ext cx="301686" cy="369332"/>
-          </a:xfrm>
-          <a:prstGeom prst="rect">
-            <a:avLst/>
-          </a:prstGeom>
-          <a:noFill/>
-        </p:spPr>
-        <p:txBody>
-          <a:bodyPr wrap="none" rtlCol="0">
-            <a:spAutoFit/>
-          </a:bodyPr>
-          <a:lstStyle/>
-          <a:p>
-            <a:r>
-              <a:rPr lang="en-US" dirty="0"/>
-              <a:t>1</a:t>
-            </a:r>
-          </a:p>
-        </p:txBody>
-      </p:sp>
-      <p:sp>
-        <p:nvSpPr>
           <p:cNvPr id="49" name="TextBox 48">
             <a:extLst>
               <a:ext uri="{FF2B5EF4-FFF2-40B4-BE49-F238E27FC236}">
@@ -5693,10 +5557,10 @@
       </p:sp>
       <p:sp>
         <p:nvSpPr>
-          <p:cNvPr id="54" name="Rectangle 53">
-            <a:extLst>
-              <a:ext uri="{FF2B5EF4-FFF2-40B4-BE49-F238E27FC236}">
-                <a16:creationId xmlns:a16="http://schemas.microsoft.com/office/drawing/2014/main" id="{509A3335-3B1C-4553-AEB8-A5567C668275}"/>
+          <p:cNvPr id="56" name="Rectangle 55">
+            <a:extLst>
+              <a:ext uri="{FF2B5EF4-FFF2-40B4-BE49-F238E27FC236}">
+                <a16:creationId xmlns:a16="http://schemas.microsoft.com/office/drawing/2014/main" id="{F5B4F608-4ED7-4138-80B5-8008D6E481C7}"/>
               </a:ext>
             </a:extLst>
           </p:cNvPr>
@@ -5705,8 +5569,116 @@
         </p:nvSpPr>
         <p:spPr>
           <a:xfrm>
-            <a:off x="7972424" y="825498"/>
-            <a:ext cx="1590675" cy="314325"/>
+            <a:off x="4454524" y="1844320"/>
+            <a:ext cx="1120776" cy="362631"/>
+          </a:xfrm>
+          <a:prstGeom prst="rect">
+            <a:avLst/>
+          </a:prstGeom>
+          <a:noFill/>
+        </p:spPr>
+        <p:style>
+          <a:lnRef idx="2">
+            <a:schemeClr val="accent1">
+              <a:shade val="50000"/>
+            </a:schemeClr>
+          </a:lnRef>
+          <a:fillRef idx="1">
+            <a:schemeClr val="accent1"/>
+          </a:fillRef>
+          <a:effectRef idx="0">
+            <a:schemeClr val="accent1"/>
+          </a:effectRef>
+          <a:fontRef idx="minor">
+            <a:schemeClr val="lt1"/>
+          </a:fontRef>
+        </p:style>
+        <p:txBody>
+          <a:bodyPr rtlCol="0" anchor="ctr"/>
+          <a:lstStyle/>
+          <a:p>
+            <a:pPr algn="ctr"/>
+            <a:r>
+              <a:rPr lang="en-US" dirty="0">
+                <a:solidFill>
+                  <a:schemeClr val="tx1"/>
+                </a:solidFill>
+              </a:rPr>
+              <a:t>Goal</a:t>
+            </a:r>
+          </a:p>
+        </p:txBody>
+      </p:sp>
+      <p:sp>
+        <p:nvSpPr>
+          <p:cNvPr id="57" name="Rectangle 56">
+            <a:extLst>
+              <a:ext uri="{FF2B5EF4-FFF2-40B4-BE49-F238E27FC236}">
+                <a16:creationId xmlns:a16="http://schemas.microsoft.com/office/drawing/2014/main" id="{EA228E92-EF8C-4B6F-9767-F5AB1E050E9C}"/>
+              </a:ext>
+            </a:extLst>
+          </p:cNvPr>
+          <p:cNvSpPr/>
+          <p:nvPr/>
+        </p:nvSpPr>
+        <p:spPr>
+          <a:xfrm>
+            <a:off x="5783790" y="1844320"/>
+            <a:ext cx="1120776" cy="362631"/>
+          </a:xfrm>
+          <a:prstGeom prst="rect">
+            <a:avLst/>
+          </a:prstGeom>
+          <a:noFill/>
+        </p:spPr>
+        <p:style>
+          <a:lnRef idx="2">
+            <a:schemeClr val="accent1">
+              <a:shade val="50000"/>
+            </a:schemeClr>
+          </a:lnRef>
+          <a:fillRef idx="1">
+            <a:schemeClr val="accent1"/>
+          </a:fillRef>
+          <a:effectRef idx="0">
+            <a:schemeClr val="accent1"/>
+          </a:effectRef>
+          <a:fontRef idx="minor">
+            <a:schemeClr val="lt1"/>
+          </a:fontRef>
+        </p:style>
+        <p:txBody>
+          <a:bodyPr rtlCol="0" anchor="ctr"/>
+          <a:lstStyle/>
+          <a:p>
+            <a:pPr algn="ctr"/>
+            <a:r>
+              <a:rPr lang="en-US" dirty="0">
+                <a:solidFill>
+                  <a:schemeClr val="tx1"/>
+                </a:solidFill>
+              </a:rPr>
+              <a:t>Time</a:t>
+            </a:r>
+          </a:p>
+        </p:txBody>
+      </p:sp>
+      <p:sp>
+        <p:nvSpPr>
+          <p:cNvPr id="59" name="Rectangle 58">
+            <a:extLst>
+              <a:ext uri="{FF2B5EF4-FFF2-40B4-BE49-F238E27FC236}">
+                <a16:creationId xmlns:a16="http://schemas.microsoft.com/office/drawing/2014/main" id="{740BE004-5A62-4C89-9A6C-1DC97536899D}"/>
+              </a:ext>
+            </a:extLst>
+          </p:cNvPr>
+          <p:cNvSpPr/>
+          <p:nvPr/>
+        </p:nvSpPr>
+        <p:spPr>
+          <a:xfrm>
+            <a:off x="7137401" y="369720"/>
+            <a:ext cx="1120776" cy="362631"/>
           </a:xfrm>
           <a:prstGeom prst="rect">
             <a:avLst/>
@@ -5742,10 +5714,10 @@
       </p:sp>
       <p:sp>
         <p:nvSpPr>
-          <p:cNvPr id="55" name="Isosceles Triangle 54">
-            <a:extLst>
-              <a:ext uri="{FF2B5EF4-FFF2-40B4-BE49-F238E27FC236}">
-                <a16:creationId xmlns:a16="http://schemas.microsoft.com/office/drawing/2014/main" id="{84A4545A-0C7F-48D6-9100-5EEED7D0182A}"/>
+          <p:cNvPr id="60" name="Rectangle 59">
+            <a:extLst>
+              <a:ext uri="{FF2B5EF4-FFF2-40B4-BE49-F238E27FC236}">
+                <a16:creationId xmlns:a16="http://schemas.microsoft.com/office/drawing/2014/main" id="{1E119182-1877-4752-A5BF-2ACB563C287C}"/>
               </a:ext>
             </a:extLst>
           </p:cNvPr>
@@ -5753,11 +5725,60 @@
           <p:nvPr/>
         </p:nvSpPr>
         <p:spPr>
-          <a:xfrm rot="10800000">
-            <a:off x="7035761" y="923334"/>
-            <a:ext cx="122275" cy="115951"/>
+          <a:xfrm>
+            <a:off x="8466669" y="362075"/>
+            <a:ext cx="1120776" cy="362631"/>
           </a:xfrm>
-          <a:prstGeom prst="triangle">
+          <a:prstGeom prst="rect">
+            <a:avLst/>
+          </a:prstGeom>
+        </p:spPr>
+        <p:style>
+          <a:lnRef idx="2">
+            <a:schemeClr val="accent1">
+              <a:shade val="50000"/>
+            </a:schemeClr>
+          </a:lnRef>
+          <a:fillRef idx="1">
+            <a:schemeClr val="accent1"/>
+          </a:fillRef>
+          <a:effectRef idx="0">
+            <a:schemeClr val="accent1"/>
+          </a:effectRef>
+          <a:fontRef idx="minor">
+            <a:schemeClr val="lt1"/>
+          </a:fontRef>
+        </p:style>
+        <p:txBody>
+          <a:bodyPr rtlCol="0" anchor="ctr"/>
+          <a:lstStyle/>
+          <a:p>
+            <a:pPr algn="ctr"/>
+            <a:r>
+              <a:rPr lang="en-US" dirty="0"/>
+              <a:t>New</a:t>
+            </a:r>
+          </a:p>
+        </p:txBody>
+      </p:sp>
+      <p:sp>
+        <p:nvSpPr>
+          <p:cNvPr id="61" name="Rectangle 60">
+            <a:extLst>
+              <a:ext uri="{FF2B5EF4-FFF2-40B4-BE49-F238E27FC236}">
+                <a16:creationId xmlns:a16="http://schemas.microsoft.com/office/drawing/2014/main" id="{70D84914-B9D0-4845-9CD2-A5F21E3C12ED}"/>
+              </a:ext>
+            </a:extLst>
+          </p:cNvPr>
+          <p:cNvSpPr/>
+          <p:nvPr/>
+        </p:nvSpPr>
+        <p:spPr>
+          <a:xfrm>
+            <a:off x="4469130" y="381427"/>
+            <a:ext cx="2022158" cy="362631"/>
+          </a:xfrm>
+          <a:prstGeom prst="rect">
             <a:avLst/>
           </a:prstGeom>
           <a:noFill/>
@@ -5779,20 +5800,18 @@
           </a:fontRef>
         </p:style>
         <p:txBody>
-          <a:bodyPr rot="0" spcFirstLastPara="0" vertOverflow="overflow" horzOverflow="overflow" vert="horz" wrap="square" lIns="91440" tIns="45720" rIns="91440" bIns="45720" numCol="1" spcCol="0" rtlCol="0" fromWordArt="0" anchor="ctr" anchorCtr="0" forceAA="0" compatLnSpc="1">
-            <a:prstTxWarp prst="textNoShape">
-              <a:avLst/>
-            </a:prstTxWarp>
-            <a:noAutofit/>
-          </a:bodyPr>
+          <a:bodyPr rtlCol="0" anchor="ctr"/>
           <a:lstStyle/>
           <a:p>
             <a:pPr algn="ctr"/>
-            <a:endParaRPr lang="en-US">
-              <a:solidFill>
-                <a:schemeClr val="tx1"/>
-              </a:solidFill>
-            </a:endParaRPr>
+            <a:r>
+              <a:rPr lang="en-US" dirty="0">
+                <a:solidFill>
+                  <a:schemeClr val="tx1"/>
+                </a:solidFill>
+              </a:rPr>
+              <a:t>Dataset name</a:t>
+            </a:r>
           </a:p>
         </p:txBody>
       </p:sp>

</xml_diff>